<commit_message>
- Update Finder Definition Generator application (slight UI alterations) - Added new document Sage300SDK_FinderDefinitionGenerator.docx - Updated Sage300SDK_2022_0WebSDKOverview.pptx (Updated screenshots and some grammer tweaks) - Regenerated Sage300UIWizardPackage.vsix
</commit_message>
<xml_diff>
--- a/docs/presentations/Sage300SDK_2022_0WebSDKOverview.pptx
+++ b/docs/presentations/Sage300SDK_2022_0WebSDKOverview.pptx
@@ -467,7 +467,7 @@
                 <a:cs typeface="Arial Regular" charset="0"/>
               </a:rPr>
               <a:pPr/>
-              <a:t>03/08/2021</a:t>
+              <a:t>13/08/2021</a:t>
             </a:fld>
             <a:endParaRPr lang="en-GB" i="0" dirty="0">
               <a:latin typeface="Arial Regular" charset="0"/>
@@ -1547,7 +1547,7 @@
           <a:p>
             <a:fld id="{5888F94E-78DA-0A44-B001-7EA9DD84ADCF}" type="datetime1">
               <a:rPr lang="en-US" smtClean="0"/>
-              <a:t>8/2/2021</a:t>
+              <a:t>8/13/2021</a:t>
             </a:fld>
             <a:endParaRPr lang="en-GB" dirty="0"/>
           </a:p>
@@ -1783,7 +1783,7 @@
           <a:p>
             <a:fld id="{E7CEA641-1E1B-F449-83C8-08B6AFC57F70}" type="datetime1">
               <a:rPr lang="en-US" smtClean="0"/>
-              <a:t>8/2/2021</a:t>
+              <a:t>8/13/2021</a:t>
             </a:fld>
             <a:endParaRPr lang="en-GB" dirty="0"/>
           </a:p>
@@ -1988,7 +1988,7 @@
           <a:p>
             <a:fld id="{C4408730-D2BD-1349-A0F9-216E3D120933}" type="datetime1">
               <a:rPr lang="en-US" smtClean="0"/>
-              <a:t>8/2/2021</a:t>
+              <a:t>8/13/2021</a:t>
             </a:fld>
             <a:endParaRPr lang="en-GB" dirty="0"/>
           </a:p>
@@ -2254,7 +2254,7 @@
           <a:p>
             <a:fld id="{692A7C57-5026-3642-8A3D-6372115071EE}" type="datetime1">
               <a:rPr lang="en-US" smtClean="0"/>
-              <a:t>8/2/2021</a:t>
+              <a:t>8/13/2021</a:t>
             </a:fld>
             <a:endParaRPr lang="en-GB" dirty="0"/>
           </a:p>
@@ -2616,7 +2616,7 @@
           <a:p>
             <a:fld id="{6113F527-9BEA-5644-A1FC-5003BCA94593}" type="datetime1">
               <a:rPr lang="en-US" smtClean="0"/>
-              <a:t>8/2/2021</a:t>
+              <a:t>8/13/2021</a:t>
             </a:fld>
             <a:endParaRPr lang="en-GB" dirty="0"/>
           </a:p>
@@ -2935,7 +2935,7 @@
           <a:p>
             <a:fld id="{A82E4E1A-03D7-724E-8BCA-533838960A70}" type="datetime1">
               <a:rPr lang="en-US" smtClean="0"/>
-              <a:t>8/2/2021</a:t>
+              <a:t>8/13/2021</a:t>
             </a:fld>
             <a:endParaRPr lang="en-GB" dirty="0"/>
           </a:p>
@@ -3579,7 +3579,7 @@
           <a:p>
             <a:fld id="{FB28A7CD-1E91-674E-89EE-B2B00E6C1F81}" type="datetime1">
               <a:rPr lang="en-US" smtClean="0"/>
-              <a:t>8/2/2021</a:t>
+              <a:t>8/13/2021</a:t>
             </a:fld>
             <a:endParaRPr lang="en-GB" dirty="0"/>
           </a:p>
@@ -4184,7 +4184,7 @@
           <a:p>
             <a:fld id="{E636F327-FED6-7B44-A731-9DC52AF69E79}" type="datetime1">
               <a:rPr lang="en-US" smtClean="0"/>
-              <a:t>8/2/2021</a:t>
+              <a:t>8/13/2021</a:t>
             </a:fld>
             <a:endParaRPr lang="en-GB" dirty="0"/>
           </a:p>
@@ -4289,7 +4289,7 @@
           <a:p>
             <a:fld id="{5563C629-E84F-A64B-A9C1-B1797219521B}" type="datetime1">
               <a:rPr lang="en-US" smtClean="0"/>
-              <a:t>8/2/2021</a:t>
+              <a:t>8/13/2021</a:t>
             </a:fld>
             <a:endParaRPr lang="en-GB" dirty="0"/>
           </a:p>
@@ -4483,7 +4483,7 @@
           <a:p>
             <a:fld id="{E636F327-FED6-7B44-A731-9DC52AF69E79}" type="datetime1">
               <a:rPr lang="en-US" smtClean="0"/>
-              <a:t>8/2/2021</a:t>
+              <a:t>8/13/2021</a:t>
             </a:fld>
             <a:endParaRPr lang="en-GB" dirty="0"/>
           </a:p>
@@ -4588,7 +4588,7 @@
           <a:p>
             <a:fld id="{5563C629-E84F-A64B-A9C1-B1797219521B}" type="datetime1">
               <a:rPr lang="en-US" smtClean="0"/>
-              <a:t>8/2/2021</a:t>
+              <a:t>8/13/2021</a:t>
             </a:fld>
             <a:endParaRPr lang="en-GB" dirty="0"/>
           </a:p>
@@ -4755,7 +4755,7 @@
           <a:p>
             <a:fld id="{7B4537B4-212E-E544-9DE3-23B45D937FC3}" type="datetime1">
               <a:rPr lang="en-US" smtClean="0"/>
-              <a:t>8/3/2021</a:t>
+              <a:t>8/13/2021</a:t>
             </a:fld>
             <a:endParaRPr lang="en-GB" dirty="0"/>
           </a:p>
@@ -4935,7 +4935,7 @@
           <a:p>
             <a:fld id="{7B4537B4-212E-E544-9DE3-23B45D937FC3}" type="datetime1">
               <a:rPr lang="en-US" smtClean="0"/>
-              <a:t>8/2/2021</a:t>
+              <a:t>8/13/2021</a:t>
             </a:fld>
             <a:endParaRPr lang="en-GB" dirty="0"/>
           </a:p>
@@ -5189,7 +5189,7 @@
           <a:p>
             <a:fld id="{7B4537B4-212E-E544-9DE3-23B45D937FC3}" type="datetime1">
               <a:rPr lang="en-US" smtClean="0"/>
-              <a:t>8/3/2021</a:t>
+              <a:t>8/13/2021</a:t>
             </a:fld>
             <a:endParaRPr lang="en-GB" dirty="0"/>
           </a:p>
@@ -5525,7 +5525,7 @@
           <a:p>
             <a:fld id="{7B4537B4-212E-E544-9DE3-23B45D937FC3}" type="datetime1">
               <a:rPr lang="en-US" smtClean="0"/>
-              <a:t>8/3/2021</a:t>
+              <a:t>8/13/2021</a:t>
             </a:fld>
             <a:endParaRPr lang="en-GB" dirty="0"/>
           </a:p>
@@ -5720,7 +5720,7 @@
           <a:p>
             <a:fld id="{7B4537B4-212E-E544-9DE3-23B45D937FC3}" type="datetime1">
               <a:rPr lang="en-US" smtClean="0"/>
-              <a:t>8/3/2021</a:t>
+              <a:t>8/13/2021</a:t>
             </a:fld>
             <a:endParaRPr lang="en-GB" dirty="0"/>
           </a:p>
@@ -5897,7 +5897,7 @@
           <a:p>
             <a:fld id="{E636F327-FED6-7B44-A731-9DC52AF69E79}" type="datetime1">
               <a:rPr lang="en-US" smtClean="0"/>
-              <a:t>8/2/2021</a:t>
+              <a:t>8/13/2021</a:t>
             </a:fld>
             <a:endParaRPr lang="en-GB" dirty="0"/>
           </a:p>
@@ -6131,7 +6131,7 @@
           <a:p>
             <a:fld id="{94732040-5182-E143-8A0A-1F1F1B9AD853}" type="datetime1">
               <a:rPr lang="en-US" smtClean="0"/>
-              <a:t>8/2/2021</a:t>
+              <a:t>8/13/2021</a:t>
             </a:fld>
             <a:endParaRPr lang="en-GB" dirty="0"/>
           </a:p>
@@ -6421,15 +6421,20 @@
           <p:nvPr/>
         </p:nvPicPr>
         <p:blipFill>
-          <a:blip r:embed="rId3"/>
-          <a:stretch>
-            <a:fillRect/>
-          </a:stretch>
+          <a:blip r:embed="rId3">
+            <a:extLst>
+              <a:ext uri="{28A0092B-C50C-407E-A947-70E740481C1C}">
+                <a14:useLocalDpi xmlns:a14="http://schemas.microsoft.com/office/drawing/2010/main" val="0"/>
+              </a:ext>
+            </a:extLst>
+          </a:blip>
+          <a:srcRect/>
+          <a:stretch/>
         </p:blipFill>
         <p:spPr>
           <a:xfrm>
-            <a:off x="6356841" y="1261236"/>
-            <a:ext cx="5435765" cy="4641531"/>
+            <a:off x="6586057" y="1261236"/>
+            <a:ext cx="4977333" cy="4641531"/>
           </a:xfrm>
           <a:prstGeom prst="rect">
             <a:avLst/>
@@ -6937,7 +6942,7 @@
           <a:p>
             <a:fld id="{5563C629-E84F-A64B-A9C1-B1797219521B}" type="datetime1">
               <a:rPr lang="en-US" smtClean="0"/>
-              <a:t>8/2/2021</a:t>
+              <a:t>8/13/2021</a:t>
             </a:fld>
             <a:endParaRPr lang="en-GB" dirty="0"/>
           </a:p>
@@ -7047,7 +7052,7 @@
           <a:p>
             <a:fld id="{7B9A185B-5299-034D-8ACE-E5F5EABAE1AB}" type="datetime1">
               <a:rPr lang="en-US" smtClean="0"/>
-              <a:t>8/2/2021</a:t>
+              <a:t>8/13/2021</a:t>
             </a:fld>
             <a:endParaRPr lang="en-GB" dirty="0"/>
           </a:p>
@@ -7393,7 +7398,7 @@
           <a:p>
             <a:fld id="{5563C629-E84F-A64B-A9C1-B1797219521B}" type="datetime1">
               <a:rPr lang="en-US" smtClean="0"/>
-              <a:t>8/2/2021</a:t>
+              <a:t>8/13/2021</a:t>
             </a:fld>
             <a:endParaRPr lang="en-GB" dirty="0"/>
           </a:p>
@@ -7503,7 +7508,7 @@
           <a:p>
             <a:fld id="{7B9A185B-5299-034D-8ACE-E5F5EABAE1AB}" type="datetime1">
               <a:rPr lang="en-US" smtClean="0"/>
-              <a:t>8/2/2021</a:t>
+              <a:t>8/13/2021</a:t>
             </a:fld>
             <a:endParaRPr lang="en-GB" dirty="0"/>
           </a:p>
@@ -7940,7 +7945,7 @@
           <a:p>
             <a:fld id="{5563C629-E84F-A64B-A9C1-B1797219521B}" type="datetime1">
               <a:rPr lang="en-US" smtClean="0"/>
-              <a:t>8/2/2021</a:t>
+              <a:t>8/13/2021</a:t>
             </a:fld>
             <a:endParaRPr lang="en-GB" dirty="0"/>
           </a:p>
@@ -8132,7 +8137,7 @@
           <a:p>
             <a:fld id="{E636F327-FED6-7B44-A731-9DC52AF69E79}" type="datetime1">
               <a:rPr lang="en-US" smtClean="0"/>
-              <a:t>8/2/2021</a:t>
+              <a:t>8/13/2021</a:t>
             </a:fld>
             <a:endParaRPr lang="en-GB" dirty="0"/>
           </a:p>
@@ -8237,7 +8242,7 @@
           <a:p>
             <a:fld id="{5563C629-E84F-A64B-A9C1-B1797219521B}" type="datetime1">
               <a:rPr lang="en-US" smtClean="0"/>
-              <a:t>8/2/2021</a:t>
+              <a:t>8/13/2021</a:t>
             </a:fld>
             <a:endParaRPr lang="en-GB" dirty="0"/>
           </a:p>
@@ -8347,7 +8352,7 @@
           <a:p>
             <a:fld id="{550DC455-A182-7641-94AB-920BA179357D}" type="datetime1">
               <a:rPr lang="en-US" smtClean="0"/>
-              <a:t>8/2/2021</a:t>
+              <a:t>8/13/2021</a:t>
             </a:fld>
             <a:endParaRPr lang="en-GB" dirty="0"/>
           </a:p>
@@ -8890,7 +8895,7 @@
           <a:p>
             <a:fld id="{5563C629-E84F-A64B-A9C1-B1797219521B}" type="datetime1">
               <a:rPr lang="en-US" smtClean="0"/>
-              <a:t>8/2/2021</a:t>
+              <a:t>8/13/2021</a:t>
             </a:fld>
             <a:endParaRPr lang="en-GB" dirty="0"/>
           </a:p>
@@ -9000,7 +9005,7 @@
           <a:p>
             <a:fld id="{550DC455-A182-7641-94AB-920BA179357D}" type="datetime1">
               <a:rPr lang="en-US" smtClean="0"/>
-              <a:t>8/2/2021</a:t>
+              <a:t>8/13/2021</a:t>
             </a:fld>
             <a:endParaRPr lang="en-GB" dirty="0"/>
           </a:p>
@@ -9329,7 +9334,7 @@
           <p:nvPr>
             <p:extLst>
               <p:ext uri="{D42A27DB-BD31-4B8C-83A1-F6EECF244321}">
-                <p14:modId xmlns:p14="http://schemas.microsoft.com/office/powerpoint/2010/main" val="1688876516"/>
+                <p14:modId xmlns:p14="http://schemas.microsoft.com/office/powerpoint/2010/main" val="1972897857"/>
               </p:ext>
             </p:extLst>
           </p:nvPr>
@@ -9381,7 +9386,7 @@
                       </a:pPr>
                       <a:r>
                         <a:rPr lang="en-GB" sz="1600" dirty="0"/>
-                        <a:t>New login.aspx for to replace hardcoded global.asax.cs logic</a:t>
+                        <a:t>New login.aspx to replace hardcoded global.asax.cs logic</a:t>
                       </a:r>
                     </a:p>
                     <a:p>
@@ -10012,7 +10017,7 @@
           <a:p>
             <a:fld id="{5563C629-E84F-A64B-A9C1-B1797219521B}" type="datetime1">
               <a:rPr lang="en-US" smtClean="0"/>
-              <a:t>8/2/2021</a:t>
+              <a:t>8/13/2021</a:t>
             </a:fld>
             <a:endParaRPr lang="en-GB" dirty="0"/>
           </a:p>

</xml_diff>

<commit_message>
TK-340295 [Final QA/Testing] - Updated all Wizard binaries (VSIX) - Updated various README.md files - Update various documents with updated screenshots and/or other minor revisions. - Removed two files from patch folder and updated README.md
</commit_message>
<xml_diff>
--- a/docs/presentations/Sage300SDK_2022_0WebSDKOverview.pptx
+++ b/docs/presentations/Sage300SDK_2022_0WebSDKOverview.pptx
@@ -467,7 +467,7 @@
                 <a:cs typeface="Arial Regular" charset="0"/>
               </a:rPr>
               <a:pPr/>
-              <a:t>20/08/2021</a:t>
+              <a:t>23/08/2021</a:t>
             </a:fld>
             <a:endParaRPr lang="en-GB" i="0" dirty="0">
               <a:latin typeface="Arial Regular" charset="0"/>
@@ -1547,7 +1547,7 @@
           <a:p>
             <a:fld id="{5888F94E-78DA-0A44-B001-7EA9DD84ADCF}" type="datetime1">
               <a:rPr lang="en-US" smtClean="0"/>
-              <a:t>8/20/2021</a:t>
+              <a:t>8/23/2021</a:t>
             </a:fld>
             <a:endParaRPr lang="en-GB" dirty="0"/>
           </a:p>
@@ -1783,7 +1783,7 @@
           <a:p>
             <a:fld id="{E7CEA641-1E1B-F449-83C8-08B6AFC57F70}" type="datetime1">
               <a:rPr lang="en-US" smtClean="0"/>
-              <a:t>8/20/2021</a:t>
+              <a:t>8/23/2021</a:t>
             </a:fld>
             <a:endParaRPr lang="en-GB" dirty="0"/>
           </a:p>
@@ -1988,7 +1988,7 @@
           <a:p>
             <a:fld id="{C4408730-D2BD-1349-A0F9-216E3D120933}" type="datetime1">
               <a:rPr lang="en-US" smtClean="0"/>
-              <a:t>8/20/2021</a:t>
+              <a:t>8/23/2021</a:t>
             </a:fld>
             <a:endParaRPr lang="en-GB" dirty="0"/>
           </a:p>
@@ -2254,7 +2254,7 @@
           <a:p>
             <a:fld id="{692A7C57-5026-3642-8A3D-6372115071EE}" type="datetime1">
               <a:rPr lang="en-US" smtClean="0"/>
-              <a:t>8/20/2021</a:t>
+              <a:t>8/23/2021</a:t>
             </a:fld>
             <a:endParaRPr lang="en-GB" dirty="0"/>
           </a:p>
@@ -2616,7 +2616,7 @@
           <a:p>
             <a:fld id="{6113F527-9BEA-5644-A1FC-5003BCA94593}" type="datetime1">
               <a:rPr lang="en-US" smtClean="0"/>
-              <a:t>8/20/2021</a:t>
+              <a:t>8/23/2021</a:t>
             </a:fld>
             <a:endParaRPr lang="en-GB" dirty="0"/>
           </a:p>
@@ -2935,7 +2935,7 @@
           <a:p>
             <a:fld id="{A82E4E1A-03D7-724E-8BCA-533838960A70}" type="datetime1">
               <a:rPr lang="en-US" smtClean="0"/>
-              <a:t>8/20/2021</a:t>
+              <a:t>8/23/2021</a:t>
             </a:fld>
             <a:endParaRPr lang="en-GB" dirty="0"/>
           </a:p>
@@ -3579,7 +3579,7 @@
           <a:p>
             <a:fld id="{FB28A7CD-1E91-674E-89EE-B2B00E6C1F81}" type="datetime1">
               <a:rPr lang="en-US" smtClean="0"/>
-              <a:t>8/20/2021</a:t>
+              <a:t>8/23/2021</a:t>
             </a:fld>
             <a:endParaRPr lang="en-GB" dirty="0"/>
           </a:p>
@@ -4184,7 +4184,7 @@
           <a:p>
             <a:fld id="{E636F327-FED6-7B44-A731-9DC52AF69E79}" type="datetime1">
               <a:rPr lang="en-US" smtClean="0"/>
-              <a:t>8/20/2021</a:t>
+              <a:t>8/23/2021</a:t>
             </a:fld>
             <a:endParaRPr lang="en-GB" dirty="0"/>
           </a:p>
@@ -4289,7 +4289,7 @@
           <a:p>
             <a:fld id="{5563C629-E84F-A64B-A9C1-B1797219521B}" type="datetime1">
               <a:rPr lang="en-US" smtClean="0"/>
-              <a:t>8/20/2021</a:t>
+              <a:t>8/23/2021</a:t>
             </a:fld>
             <a:endParaRPr lang="en-GB" dirty="0"/>
           </a:p>
@@ -4483,7 +4483,7 @@
           <a:p>
             <a:fld id="{E636F327-FED6-7B44-A731-9DC52AF69E79}" type="datetime1">
               <a:rPr lang="en-US" smtClean="0"/>
-              <a:t>8/20/2021</a:t>
+              <a:t>8/23/2021</a:t>
             </a:fld>
             <a:endParaRPr lang="en-GB" dirty="0"/>
           </a:p>
@@ -4588,7 +4588,7 @@
           <a:p>
             <a:fld id="{5563C629-E84F-A64B-A9C1-B1797219521B}" type="datetime1">
               <a:rPr lang="en-US" smtClean="0"/>
-              <a:t>8/20/2021</a:t>
+              <a:t>8/23/2021</a:t>
             </a:fld>
             <a:endParaRPr lang="en-GB" dirty="0"/>
           </a:p>
@@ -4755,7 +4755,7 @@
           <a:p>
             <a:fld id="{7B4537B4-212E-E544-9DE3-23B45D937FC3}" type="datetime1">
               <a:rPr lang="en-US" smtClean="0"/>
-              <a:t>8/20/2021</a:t>
+              <a:t>8/23/2021</a:t>
             </a:fld>
             <a:endParaRPr lang="en-GB" dirty="0"/>
           </a:p>
@@ -4935,7 +4935,7 @@
           <a:p>
             <a:fld id="{7B4537B4-212E-E544-9DE3-23B45D937FC3}" type="datetime1">
               <a:rPr lang="en-US" smtClean="0"/>
-              <a:t>8/20/2021</a:t>
+              <a:t>8/23/2021</a:t>
             </a:fld>
             <a:endParaRPr lang="en-GB" dirty="0"/>
           </a:p>
@@ -5189,7 +5189,7 @@
           <a:p>
             <a:fld id="{7B4537B4-212E-E544-9DE3-23B45D937FC3}" type="datetime1">
               <a:rPr lang="en-US" smtClean="0"/>
-              <a:t>8/20/2021</a:t>
+              <a:t>8/23/2021</a:t>
             </a:fld>
             <a:endParaRPr lang="en-GB" dirty="0"/>
           </a:p>
@@ -5525,7 +5525,7 @@
           <a:p>
             <a:fld id="{7B4537B4-212E-E544-9DE3-23B45D937FC3}" type="datetime1">
               <a:rPr lang="en-US" smtClean="0"/>
-              <a:t>8/20/2021</a:t>
+              <a:t>8/23/2021</a:t>
             </a:fld>
             <a:endParaRPr lang="en-GB" dirty="0"/>
           </a:p>
@@ -5720,7 +5720,7 @@
           <a:p>
             <a:fld id="{7B4537B4-212E-E544-9DE3-23B45D937FC3}" type="datetime1">
               <a:rPr lang="en-US" smtClean="0"/>
-              <a:t>8/20/2021</a:t>
+              <a:t>8/23/2021</a:t>
             </a:fld>
             <a:endParaRPr lang="en-GB" dirty="0"/>
           </a:p>
@@ -5897,7 +5897,7 @@
           <a:p>
             <a:fld id="{E636F327-FED6-7B44-A731-9DC52AF69E79}" type="datetime1">
               <a:rPr lang="en-US" smtClean="0"/>
-              <a:t>8/20/2021</a:t>
+              <a:t>8/23/2021</a:t>
             </a:fld>
             <a:endParaRPr lang="en-GB" dirty="0"/>
           </a:p>
@@ -6131,7 +6131,7 @@
           <a:p>
             <a:fld id="{94732040-5182-E143-8A0A-1F1F1B9AD853}" type="datetime1">
               <a:rPr lang="en-US" smtClean="0"/>
-              <a:t>8/20/2021</a:t>
+              <a:t>8/23/2021</a:t>
             </a:fld>
             <a:endParaRPr lang="en-GB" dirty="0"/>
           </a:p>
@@ -6855,15 +6855,20 @@
           <p:nvPr/>
         </p:nvPicPr>
         <p:blipFill>
-          <a:blip r:embed="rId3"/>
-          <a:stretch>
-            <a:fillRect/>
-          </a:stretch>
+          <a:blip r:embed="rId3">
+            <a:extLst>
+              <a:ext uri="{28A0092B-C50C-407E-A947-70E740481C1C}">
+                <a14:useLocalDpi xmlns:a14="http://schemas.microsoft.com/office/drawing/2010/main" val="0"/>
+              </a:ext>
+            </a:extLst>
+          </a:blip>
+          <a:srcRect/>
+          <a:stretch/>
         </p:blipFill>
         <p:spPr>
           <a:xfrm>
-            <a:off x="5454328" y="1253655"/>
-            <a:ext cx="6587304" cy="4695385"/>
+            <a:off x="5454328" y="1425695"/>
+            <a:ext cx="6587304" cy="4351304"/>
           </a:xfrm>
           <a:prstGeom prst="rect">
             <a:avLst/>
@@ -6957,7 +6962,7 @@
           <a:p>
             <a:fld id="{5563C629-E84F-A64B-A9C1-B1797219521B}" type="datetime1">
               <a:rPr lang="en-US" smtClean="0"/>
-              <a:t>8/20/2021</a:t>
+              <a:t>8/23/2021</a:t>
             </a:fld>
             <a:endParaRPr lang="en-GB" dirty="0"/>
           </a:p>
@@ -7067,7 +7072,7 @@
           <a:p>
             <a:fld id="{7B9A185B-5299-034D-8ACE-E5F5EABAE1AB}" type="datetime1">
               <a:rPr lang="en-US" smtClean="0"/>
-              <a:t>8/20/2021</a:t>
+              <a:t>8/23/2021</a:t>
             </a:fld>
             <a:endParaRPr lang="en-GB" dirty="0"/>
           </a:p>
@@ -7413,7 +7418,7 @@
           <a:p>
             <a:fld id="{5563C629-E84F-A64B-A9C1-B1797219521B}" type="datetime1">
               <a:rPr lang="en-US" smtClean="0"/>
-              <a:t>8/20/2021</a:t>
+              <a:t>8/23/2021</a:t>
             </a:fld>
             <a:endParaRPr lang="en-GB" dirty="0"/>
           </a:p>
@@ -7523,7 +7528,7 @@
           <a:p>
             <a:fld id="{7B9A185B-5299-034D-8ACE-E5F5EABAE1AB}" type="datetime1">
               <a:rPr lang="en-US" smtClean="0"/>
-              <a:t>8/20/2021</a:t>
+              <a:t>8/23/2021</a:t>
             </a:fld>
             <a:endParaRPr lang="en-GB" dirty="0"/>
           </a:p>
@@ -7960,7 +7965,7 @@
           <a:p>
             <a:fld id="{5563C629-E84F-A64B-A9C1-B1797219521B}" type="datetime1">
               <a:rPr lang="en-US" smtClean="0"/>
-              <a:t>8/20/2021</a:t>
+              <a:t>8/23/2021</a:t>
             </a:fld>
             <a:endParaRPr lang="en-GB" dirty="0"/>
           </a:p>
@@ -8152,7 +8157,7 @@
           <a:p>
             <a:fld id="{E636F327-FED6-7B44-A731-9DC52AF69E79}" type="datetime1">
               <a:rPr lang="en-US" smtClean="0"/>
-              <a:t>8/20/2021</a:t>
+              <a:t>8/23/2021</a:t>
             </a:fld>
             <a:endParaRPr lang="en-GB" dirty="0"/>
           </a:p>
@@ -8257,7 +8262,7 @@
           <a:p>
             <a:fld id="{5563C629-E84F-A64B-A9C1-B1797219521B}" type="datetime1">
               <a:rPr lang="en-US" smtClean="0"/>
-              <a:t>8/20/2021</a:t>
+              <a:t>8/23/2021</a:t>
             </a:fld>
             <a:endParaRPr lang="en-GB" dirty="0"/>
           </a:p>
@@ -8367,7 +8372,7 @@
           <a:p>
             <a:fld id="{550DC455-A182-7641-94AB-920BA179357D}" type="datetime1">
               <a:rPr lang="en-US" smtClean="0"/>
-              <a:t>8/20/2021</a:t>
+              <a:t>8/23/2021</a:t>
             </a:fld>
             <a:endParaRPr lang="en-GB" dirty="0"/>
           </a:p>
@@ -8936,7 +8941,7 @@
           <a:p>
             <a:fld id="{5563C629-E84F-A64B-A9C1-B1797219521B}" type="datetime1">
               <a:rPr lang="en-US" smtClean="0"/>
-              <a:t>8/20/2021</a:t>
+              <a:t>8/23/2021</a:t>
             </a:fld>
             <a:endParaRPr lang="en-GB" dirty="0"/>
           </a:p>
@@ -9046,7 +9051,7 @@
           <a:p>
             <a:fld id="{550DC455-A182-7641-94AB-920BA179357D}" type="datetime1">
               <a:rPr lang="en-US" smtClean="0"/>
-              <a:t>8/20/2021</a:t>
+              <a:t>8/23/2021</a:t>
             </a:fld>
             <a:endParaRPr lang="en-GB" dirty="0"/>
           </a:p>
@@ -10071,7 +10076,7 @@
           <a:p>
             <a:fld id="{5563C629-E84F-A64B-A9C1-B1797219521B}" type="datetime1">
               <a:rPr lang="en-US" smtClean="0"/>
-              <a:t>8/20/2021</a:t>
+              <a:t>8/23/2021</a:t>
             </a:fld>
             <a:endParaRPr lang="en-GB" dirty="0"/>
           </a:p>

</xml_diff>

<commit_message>
Manually merged JT's changes to Sage300SDK_2022_0WebSDKOverview.pptx and Sage300SDK_2022_0UpgradeGuide.docx
</commit_message>
<xml_diff>
--- a/docs/presentations/Sage300SDK_2022_0WebSDKOverview.pptx
+++ b/docs/presentations/Sage300SDK_2022_0WebSDKOverview.pptx
@@ -4143,6 +4143,13 @@
               <a:t>Refactored to leverage new composite helpers</a:t>
             </a:r>
           </a:p>
+          <a:p>
+            <a:pPr lvl="1"/>
+            <a:r>
+              <a:rPr lang="en-US" dirty="0"/>
+              <a:t>Refactored to use new web finders</a:t>
+            </a:r>
+          </a:p>
         </p:txBody>
       </p:sp>
       <p:sp>
@@ -6867,8 +6874,8 @@
         </p:blipFill>
         <p:spPr>
           <a:xfrm>
-            <a:off x="5454328" y="1425695"/>
-            <a:ext cx="6587304" cy="4351304"/>
+            <a:off x="5455113" y="1253655"/>
+            <a:ext cx="6585734" cy="4695385"/>
           </a:xfrm>
           <a:prstGeom prst="rect">
             <a:avLst/>

</xml_diff>